<commit_message>
Data types examples and lecture
</commit_message>
<xml_diff>
--- a/02-Programming-Languages.pptx
+++ b/02-Programming-Languages.pptx
@@ -121,6 +121,22 @@
       </a:defRPr>
     </a:lvl9pPr>
   </p:defaultTextStyle>
+  <p:extLst>
+    <p:ext uri="{EFAFB233-063F-42B5-8137-9DF3F51BA10A}">
+      <p15:sldGuideLst xmlns:p15="http://schemas.microsoft.com/office/powerpoint/2012/main">
+        <p15:guide id="1" orient="horz" pos="2160">
+          <p15:clr>
+            <a:srgbClr val="A4A3A4"/>
+          </p15:clr>
+        </p15:guide>
+        <p15:guide id="2" pos="2880">
+          <p15:clr>
+            <a:srgbClr val="A4A3A4"/>
+          </p15:clr>
+        </p15:guide>
+      </p15:sldGuideLst>
+    </p:ext>
+  </p:extLst>
 </p:presentation>
 </file>
 
@@ -305,7 +321,7 @@
           <a:p>
             <a:fld id="{3EA744D9-3FBE-48D8-BF2A-85DF203E4D20}" type="datetimeFigureOut">
               <a:rPr lang="bg-BG" smtClean="0"/>
-              <a:t>9.6.2015 г.</a:t>
+              <a:t>15.10.2015 г.</a:t>
             </a:fld>
             <a:endParaRPr lang="bg-BG"/>
           </a:p>
@@ -475,7 +491,7 @@
           <a:p>
             <a:fld id="{3EA744D9-3FBE-48D8-BF2A-85DF203E4D20}" type="datetimeFigureOut">
               <a:rPr lang="bg-BG" smtClean="0"/>
-              <a:t>9.6.2015 г.</a:t>
+              <a:t>15.10.2015 г.</a:t>
             </a:fld>
             <a:endParaRPr lang="bg-BG"/>
           </a:p>
@@ -655,7 +671,7 @@
           <a:p>
             <a:fld id="{3EA744D9-3FBE-48D8-BF2A-85DF203E4D20}" type="datetimeFigureOut">
               <a:rPr lang="bg-BG" smtClean="0"/>
-              <a:t>9.6.2015 г.</a:t>
+              <a:t>15.10.2015 г.</a:t>
             </a:fld>
             <a:endParaRPr lang="bg-BG"/>
           </a:p>
@@ -825,7 +841,7 @@
           <a:p>
             <a:fld id="{3EA744D9-3FBE-48D8-BF2A-85DF203E4D20}" type="datetimeFigureOut">
               <a:rPr lang="bg-BG" smtClean="0"/>
-              <a:t>9.6.2015 г.</a:t>
+              <a:t>15.10.2015 г.</a:t>
             </a:fld>
             <a:endParaRPr lang="bg-BG"/>
           </a:p>
@@ -1071,7 +1087,7 @@
           <a:p>
             <a:fld id="{3EA744D9-3FBE-48D8-BF2A-85DF203E4D20}" type="datetimeFigureOut">
               <a:rPr lang="bg-BG" smtClean="0"/>
-              <a:t>9.6.2015 г.</a:t>
+              <a:t>15.10.2015 г.</a:t>
             </a:fld>
             <a:endParaRPr lang="bg-BG"/>
           </a:p>
@@ -1359,7 +1375,7 @@
           <a:p>
             <a:fld id="{3EA744D9-3FBE-48D8-BF2A-85DF203E4D20}" type="datetimeFigureOut">
               <a:rPr lang="bg-BG" smtClean="0"/>
-              <a:t>9.6.2015 г.</a:t>
+              <a:t>15.10.2015 г.</a:t>
             </a:fld>
             <a:endParaRPr lang="bg-BG"/>
           </a:p>
@@ -1781,7 +1797,7 @@
           <a:p>
             <a:fld id="{3EA744D9-3FBE-48D8-BF2A-85DF203E4D20}" type="datetimeFigureOut">
               <a:rPr lang="bg-BG" smtClean="0"/>
-              <a:t>9.6.2015 г.</a:t>
+              <a:t>15.10.2015 г.</a:t>
             </a:fld>
             <a:endParaRPr lang="bg-BG"/>
           </a:p>
@@ -1899,7 +1915,7 @@
           <a:p>
             <a:fld id="{3EA744D9-3FBE-48D8-BF2A-85DF203E4D20}" type="datetimeFigureOut">
               <a:rPr lang="bg-BG" smtClean="0"/>
-              <a:t>9.6.2015 г.</a:t>
+              <a:t>15.10.2015 г.</a:t>
             </a:fld>
             <a:endParaRPr lang="bg-BG"/>
           </a:p>
@@ -1994,7 +2010,7 @@
           <a:p>
             <a:fld id="{3EA744D9-3FBE-48D8-BF2A-85DF203E4D20}" type="datetimeFigureOut">
               <a:rPr lang="bg-BG" smtClean="0"/>
-              <a:t>9.6.2015 г.</a:t>
+              <a:t>15.10.2015 г.</a:t>
             </a:fld>
             <a:endParaRPr lang="bg-BG"/>
           </a:p>
@@ -2271,7 +2287,7 @@
           <a:p>
             <a:fld id="{3EA744D9-3FBE-48D8-BF2A-85DF203E4D20}" type="datetimeFigureOut">
               <a:rPr lang="bg-BG" smtClean="0"/>
-              <a:t>9.6.2015 г.</a:t>
+              <a:t>15.10.2015 г.</a:t>
             </a:fld>
             <a:endParaRPr lang="bg-BG"/>
           </a:p>
@@ -2524,7 +2540,7 @@
           <a:p>
             <a:fld id="{3EA744D9-3FBE-48D8-BF2A-85DF203E4D20}" type="datetimeFigureOut">
               <a:rPr lang="bg-BG" smtClean="0"/>
-              <a:t>9.6.2015 г.</a:t>
+              <a:t>15.10.2015 г.</a:t>
             </a:fld>
             <a:endParaRPr lang="bg-BG"/>
           </a:p>
@@ -2746,7 +2762,7 @@
           <a:p>
             <a:fld id="{3EA744D9-3FBE-48D8-BF2A-85DF203E4D20}" type="datetimeFigureOut">
               <a:rPr lang="bg-BG" smtClean="0"/>
-              <a:t>9.6.2015 г.</a:t>
+              <a:t>15.10.2015 г.</a:t>
             </a:fld>
             <a:endParaRPr lang="bg-BG"/>
           </a:p>
@@ -4880,7 +4896,17 @@
                   </a:schemeClr>
                 </a:solidFill>
               </a:rPr>
-              <a:t>Асемблерни езици</a:t>
+              <a:t>Асемблерни </a:t>
+            </a:r>
+            <a:r>
+              <a:rPr lang="bg-BG" dirty="0" smtClean="0">
+                <a:solidFill>
+                  <a:schemeClr val="bg1">
+                    <a:lumMod val="95000"/>
+                  </a:schemeClr>
+                </a:solidFill>
+              </a:rPr>
+              <a:t>езици</a:t>
             </a:r>
             <a:endParaRPr lang="en-US" dirty="0" smtClean="0">
               <a:solidFill>
@@ -5791,6 +5817,13 @@
   <p:clrMapOvr>
     <a:masterClrMapping/>
   </p:clrMapOvr>
+  <p:timing>
+    <p:tnLst>
+      <p:par>
+        <p:cTn id="1" dur="indefinite" restart="never" nodeType="tmRoot"/>
+      </p:par>
+    </p:tnLst>
+  </p:timing>
 </p:sld>
 </file>
 

</xml_diff>